<commit_message>
update intro to git presentation
</commit_message>
<xml_diff>
--- a/IntroToGit/Presentation.pptx
+++ b/IntroToGit/Presentation.pptx
@@ -227,7 +227,7 @@
           <a:p>
             <a:fld id="{19104133-B5B0-4351-8158-4F0E5EB1E2BF}" type="datetimeFigureOut">
               <a:rPr lang="en-US" smtClean="0"/>
-              <a:t>2/22/2021</a:t>
+              <a:t>2/7/2022</a:t>
             </a:fld>
             <a:endParaRPr lang="en-US"/>
           </a:p>
@@ -856,7 +856,7 @@
             </a:r>
             <a:r>
               <a:rPr lang="en-US" b="1" baseline="0" dirty="0"/>
-              <a:t>master</a:t>
+              <a:t>main</a:t>
             </a:r>
             <a:r>
               <a:rPr lang="en-US" b="0" baseline="0" dirty="0"/>
@@ -894,7 +894,7 @@
             </a:r>
             <a:r>
               <a:rPr lang="en-US" b="1" baseline="0" dirty="0"/>
-              <a:t>master</a:t>
+              <a:t>main</a:t>
             </a:r>
             <a:r>
               <a:rPr lang="en-US" b="0" baseline="0" dirty="0"/>
@@ -1024,7 +1024,7 @@
             </a:r>
             <a:r>
               <a:rPr lang="en-US" b="1" baseline="0" dirty="0"/>
-              <a:t>master</a:t>
+              <a:t>main</a:t>
             </a:r>
             <a:r>
               <a:rPr lang="en-US" b="0" baseline="0" dirty="0"/>
@@ -1032,7 +1032,7 @@
             </a:r>
             <a:r>
               <a:rPr lang="en-US" b="1" baseline="0" dirty="0"/>
-              <a:t>master</a:t>
+              <a:t>main</a:t>
             </a:r>
             <a:r>
               <a:rPr lang="en-US" b="0" baseline="0" dirty="0"/>
@@ -1266,7 +1266,7 @@
             </a:r>
             <a:r>
               <a:rPr lang="en-US" b="1" baseline="0" dirty="0"/>
-              <a:t>Note that this does not affect the master branch.</a:t>
+              <a:t>Note that this does not affect the main branch.</a:t>
             </a:r>
           </a:p>
           <a:p>
@@ -1449,7 +1449,15 @@
             </a:r>
             <a:r>
               <a:rPr lang="en-US" i="1" baseline="0" dirty="0"/>
-              <a:t> depiction of changes from master merging into the feature branch, but that is also important.</a:t>
+              <a:t> depiction of changes </a:t>
+            </a:r>
+            <a:r>
+              <a:rPr lang="en-US" i="1" baseline="0"/>
+              <a:t>from main </a:t>
+            </a:r>
+            <a:r>
+              <a:rPr lang="en-US" i="1" baseline="0" dirty="0"/>
+              <a:t>merging into the feature branch, but that is also important.</a:t>
             </a:r>
             <a:r>
               <a:rPr lang="en-US" i="1" dirty="0"/>
@@ -2776,7 +2784,7 @@
             <a:fld id="{1C2D31DE-C454-491C-B5C3-F097855E3DF7}" type="datetime4">
               <a:rPr lang="en-US" smtClean="0"/>
               <a:pPr/>
-              <a:t>February 22, 2021</a:t>
+              <a:t>February 7, 2022</a:t>
             </a:fld>
             <a:endParaRPr lang="en-US" dirty="0"/>
           </a:p>
@@ -6168,7 +6176,7 @@
           <a:p>
             <a:fld id="{5958763E-B898-436D-883D-03711491D54A}" type="datetimeFigureOut">
               <a:rPr lang="en-US" smtClean="0"/>
-              <a:t>2/22/2021</a:t>
+              <a:t>2/7/2022</a:t>
             </a:fld>
             <a:endParaRPr lang="en-US"/>
           </a:p>
@@ -6361,7 +6369,7 @@
           <a:p>
             <a:fld id="{5958763E-B898-436D-883D-03711491D54A}" type="datetimeFigureOut">
               <a:rPr lang="en-US" smtClean="0"/>
-              <a:t>2/22/2021</a:t>
+              <a:t>2/7/2022</a:t>
             </a:fld>
             <a:endParaRPr lang="en-US"/>
           </a:p>
@@ -6611,7 +6619,7 @@
           <a:p>
             <a:fld id="{5958763E-B898-436D-883D-03711491D54A}" type="datetimeFigureOut">
               <a:rPr lang="en-US" smtClean="0"/>
-              <a:t>2/22/2021</a:t>
+              <a:t>2/7/2022</a:t>
             </a:fld>
             <a:endParaRPr lang="en-US"/>
           </a:p>
@@ -6959,7 +6967,7 @@
           <a:p>
             <a:fld id="{5958763E-B898-436D-883D-03711491D54A}" type="datetimeFigureOut">
               <a:rPr lang="en-US" smtClean="0"/>
-              <a:t>2/22/2021</a:t>
+              <a:t>2/7/2022</a:t>
             </a:fld>
             <a:endParaRPr lang="en-US"/>
           </a:p>
@@ -7375,7 +7383,7 @@
           <a:p>
             <a:fld id="{5958763E-B898-436D-883D-03711491D54A}" type="datetimeFigureOut">
               <a:rPr lang="en-US" smtClean="0"/>
-              <a:t>2/22/2021</a:t>
+              <a:t>2/7/2022</a:t>
             </a:fld>
             <a:endParaRPr lang="en-US"/>
           </a:p>
@@ -7876,7 +7884,7 @@
           <a:p>
             <a:fld id="{5958763E-B898-436D-883D-03711491D54A}" type="datetimeFigureOut">
               <a:rPr lang="en-US" smtClean="0"/>
-              <a:t>2/22/2021</a:t>
+              <a:t>2/7/2022</a:t>
             </a:fld>
             <a:endParaRPr lang="en-US"/>
           </a:p>
@@ -8327,7 +8335,7 @@
           <a:p>
             <a:fld id="{5958763E-B898-436D-883D-03711491D54A}" type="datetimeFigureOut">
               <a:rPr lang="en-US" smtClean="0"/>
-              <a:t>2/22/2021</a:t>
+              <a:t>2/7/2022</a:t>
             </a:fld>
             <a:endParaRPr lang="en-US"/>
           </a:p>
@@ -8938,7 +8946,7 @@
           <a:p>
             <a:fld id="{5958763E-B898-436D-883D-03711491D54A}" type="datetimeFigureOut">
               <a:rPr lang="en-US" smtClean="0"/>
-              <a:t>2/22/2021</a:t>
+              <a:t>2/7/2022</a:t>
             </a:fld>
             <a:endParaRPr lang="en-US"/>
           </a:p>
@@ -9709,7 +9717,7 @@
           <a:p>
             <a:fld id="{5958763E-B898-436D-883D-03711491D54A}" type="datetimeFigureOut">
               <a:rPr lang="en-US" smtClean="0"/>
-              <a:t>2/22/2021</a:t>
+              <a:t>2/7/2022</a:t>
             </a:fld>
             <a:endParaRPr lang="en-US"/>
           </a:p>
@@ -9813,7 +9821,7 @@
           <a:p>
             <a:fld id="{5958763E-B898-436D-883D-03711491D54A}" type="datetimeFigureOut">
               <a:rPr lang="en-US" smtClean="0"/>
-              <a:t>2/22/2021</a:t>
+              <a:t>2/7/2022</a:t>
             </a:fld>
             <a:endParaRPr lang="en-US"/>
           </a:p>
@@ -10140,7 +10148,7 @@
             <a:fld id="{1C2D31DE-C454-491C-B5C3-F097855E3DF7}" type="datetime4">
               <a:rPr lang="en-US" smtClean="0"/>
               <a:pPr/>
-              <a:t>February 22, 2021</a:t>
+              <a:t>February 7, 2022</a:t>
             </a:fld>
             <a:endParaRPr lang="en-US" dirty="0"/>
           </a:p>
@@ -13292,7 +13300,7 @@
           <a:p>
             <a:fld id="{5958763E-B898-436D-883D-03711491D54A}" type="datetimeFigureOut">
               <a:rPr lang="en-US" smtClean="0"/>
-              <a:t>2/22/2021</a:t>
+              <a:t>2/7/2022</a:t>
             </a:fld>
             <a:endParaRPr lang="en-US"/>
           </a:p>
@@ -13416,7 +13424,7 @@
           <a:p>
             <a:fld id="{5958763E-B898-436D-883D-03711491D54A}" type="datetimeFigureOut">
               <a:rPr lang="en-US" smtClean="0"/>
-              <a:t>2/22/2021</a:t>
+              <a:t>2/7/2022</a:t>
             </a:fld>
             <a:endParaRPr lang="en-US"/>
           </a:p>
@@ -13540,7 +13548,7 @@
           <a:p>
             <a:fld id="{5958763E-B898-436D-883D-03711491D54A}" type="datetimeFigureOut">
               <a:rPr lang="en-US" smtClean="0"/>
-              <a:t>2/22/2021</a:t>
+              <a:t>2/7/2022</a:t>
             </a:fld>
             <a:endParaRPr lang="en-US"/>
           </a:p>
@@ -13664,7 +13672,7 @@
           <a:p>
             <a:fld id="{5958763E-B898-436D-883D-03711491D54A}" type="datetimeFigureOut">
               <a:rPr lang="en-US" smtClean="0"/>
-              <a:t>2/22/2021</a:t>
+              <a:t>2/7/2022</a:t>
             </a:fld>
             <a:endParaRPr lang="en-US"/>
           </a:p>
@@ -13788,7 +13796,7 @@
           <a:p>
             <a:fld id="{5958763E-B898-436D-883D-03711491D54A}" type="datetimeFigureOut">
               <a:rPr lang="en-US" smtClean="0"/>
-              <a:t>2/22/2021</a:t>
+              <a:t>2/7/2022</a:t>
             </a:fld>
             <a:endParaRPr lang="en-US"/>
           </a:p>
@@ -13912,7 +13920,7 @@
           <a:p>
             <a:fld id="{5958763E-B898-436D-883D-03711491D54A}" type="datetimeFigureOut">
               <a:rPr lang="en-US" smtClean="0"/>
-              <a:t>2/22/2021</a:t>
+              <a:t>2/7/2022</a:t>
             </a:fld>
             <a:endParaRPr lang="en-US"/>
           </a:p>
@@ -14036,7 +14044,7 @@
           <a:p>
             <a:fld id="{5958763E-B898-436D-883D-03711491D54A}" type="datetimeFigureOut">
               <a:rPr lang="en-US" smtClean="0"/>
-              <a:t>2/22/2021</a:t>
+              <a:t>2/7/2022</a:t>
             </a:fld>
             <a:endParaRPr lang="en-US"/>
           </a:p>
@@ -14160,7 +14168,7 @@
           <a:p>
             <a:fld id="{5958763E-B898-436D-883D-03711491D54A}" type="datetimeFigureOut">
               <a:rPr lang="en-US" smtClean="0"/>
-              <a:t>2/22/2021</a:t>
+              <a:t>2/7/2022</a:t>
             </a:fld>
             <a:endParaRPr lang="en-US"/>
           </a:p>
@@ -14293,7 +14301,7 @@
           <a:p>
             <a:fld id="{5958763E-B898-436D-883D-03711491D54A}" type="datetimeFigureOut">
               <a:rPr lang="en-US" smtClean="0"/>
-              <a:t>2/22/2021</a:t>
+              <a:t>2/7/2022</a:t>
             </a:fld>
             <a:endParaRPr lang="en-US"/>
           </a:p>
@@ -17632,7 +17640,7 @@
             <a:fld id="{1C2D31DE-C454-491C-B5C3-F097855E3DF7}" type="datetime4">
               <a:rPr lang="en-US" smtClean="0"/>
               <a:pPr/>
-              <a:t>February 22, 2021</a:t>
+              <a:t>February 7, 2022</a:t>
             </a:fld>
             <a:endParaRPr lang="en-US" dirty="0"/>
           </a:p>
@@ -29868,7 +29876,7 @@
           <a:p>
             <a:fld id="{5958763E-B898-436D-883D-03711491D54A}" type="datetimeFigureOut">
               <a:rPr lang="en-US" smtClean="0"/>
-              <a:t>2/22/2021</a:t>
+              <a:t>2/7/2022</a:t>
             </a:fld>
             <a:endParaRPr lang="en-US"/>
           </a:p>
@@ -30270,7 +30278,7 @@
           <a:p>
             <a:fld id="{5958763E-B898-436D-883D-03711491D54A}" type="datetimeFigureOut">
               <a:rPr lang="en-US" smtClean="0"/>
-              <a:t>2/22/2021</a:t>
+              <a:t>2/7/2022</a:t>
             </a:fld>
             <a:endParaRPr lang="en-US"/>
           </a:p>
@@ -30564,7 +30572,7 @@
           <a:p>
             <a:fld id="{5958763E-B898-436D-883D-03711491D54A}" type="datetimeFigureOut">
               <a:rPr lang="en-US" smtClean="0"/>
-              <a:t>2/22/2021</a:t>
+              <a:t>2/7/2022</a:t>
             </a:fld>
             <a:endParaRPr lang="en-US"/>
           </a:p>
@@ -30765,7 +30773,7 @@
           <a:p>
             <a:fld id="{5958763E-B898-436D-883D-03711491D54A}" type="datetimeFigureOut">
               <a:rPr lang="en-US" smtClean="0"/>
-              <a:t>2/22/2021</a:t>
+              <a:t>2/7/2022</a:t>
             </a:fld>
             <a:endParaRPr lang="en-US"/>
           </a:p>
@@ -31026,7 +31034,7 @@
           <a:p>
             <a:fld id="{5958763E-B898-436D-883D-03711491D54A}" type="datetimeFigureOut">
               <a:rPr lang="en-US" smtClean="0"/>
-              <a:t>2/22/2021</a:t>
+              <a:t>2/7/2022</a:t>
             </a:fld>
             <a:endParaRPr lang="en-US"/>
           </a:p>
@@ -31534,7 +31542,7 @@
           <a:p>
             <a:fld id="{5958763E-B898-436D-883D-03711491D54A}" type="datetimeFigureOut">
               <a:rPr lang="en-US" smtClean="0"/>
-              <a:t>2/22/2021</a:t>
+              <a:t>2/7/2022</a:t>
             </a:fld>
             <a:endParaRPr lang="en-US"/>
           </a:p>
@@ -32013,7 +32021,7 @@
           <a:p>
             <a:fld id="{5958763E-B898-436D-883D-03711491D54A}" type="datetimeFigureOut">
               <a:rPr lang="en-US" smtClean="0"/>
-              <a:t>2/22/2021</a:t>
+              <a:t>2/7/2022</a:t>
             </a:fld>
             <a:endParaRPr lang="en-US"/>
           </a:p>
@@ -32832,7 +32840,7 @@
           <a:p>
             <a:fld id="{5958763E-B898-436D-883D-03711491D54A}" type="datetimeFigureOut">
               <a:rPr lang="en-US" smtClean="0"/>
-              <a:t>2/22/2021</a:t>
+              <a:t>2/7/2022</a:t>
             </a:fld>
             <a:endParaRPr lang="en-US"/>
           </a:p>
@@ -33033,7 +33041,7 @@
           <a:p>
             <a:fld id="{5958763E-B898-436D-883D-03711491D54A}" type="datetimeFigureOut">
               <a:rPr lang="en-US" smtClean="0"/>
-              <a:t>2/22/2021</a:t>
+              <a:t>2/7/2022</a:t>
             </a:fld>
             <a:endParaRPr lang="en-US"/>
           </a:p>
@@ -33368,7 +33376,7 @@
           <a:p>
             <a:fld id="{5958763E-B898-436D-883D-03711491D54A}" type="datetimeFigureOut">
               <a:rPr lang="en-US" smtClean="0"/>
-              <a:t>2/22/2021</a:t>
+              <a:t>2/7/2022</a:t>
             </a:fld>
             <a:endParaRPr lang="en-US"/>
           </a:p>
@@ -33598,7 +33606,7 @@
           <a:p>
             <a:fld id="{5958763E-B898-436D-883D-03711491D54A}" type="datetimeFigureOut">
               <a:rPr lang="en-US" smtClean="0"/>
-              <a:t>2/22/2021</a:t>
+              <a:t>2/7/2022</a:t>
             </a:fld>
             <a:endParaRPr lang="en-US"/>
           </a:p>
@@ -33842,7 +33850,7 @@
           <a:p>
             <a:fld id="{5958763E-B898-436D-883D-03711491D54A}" type="datetimeFigureOut">
               <a:rPr lang="en-US" smtClean="0"/>
-              <a:t>2/22/2021</a:t>
+              <a:t>2/7/2022</a:t>
             </a:fld>
             <a:endParaRPr lang="en-US"/>
           </a:p>
@@ -39824,7 +39832,7 @@
             </a:r>
             <a:r>
               <a:rPr lang="en-US" sz="2400" b="1" dirty="0"/>
-              <a:t>master</a:t>
+              <a:t>main</a:t>
             </a:r>
             <a:r>
               <a:rPr lang="en-US" sz="2400" dirty="0"/>
@@ -39838,47 +39846,6 @@
           </a:p>
         </p:txBody>
       </p:sp>
-      <p:pic>
-        <p:nvPicPr>
-          <p:cNvPr id="4" name="Picture 2" descr="https://guides.github.com/activities/hello-world/branching.png"/>
-          <p:cNvPicPr>
-            <a:picLocks noChangeAspect="1" noChangeArrowheads="1"/>
-          </p:cNvPicPr>
-          <p:nvPr/>
-        </p:nvPicPr>
-        <p:blipFill>
-          <a:blip r:embed="rId3">
-            <a:extLst>
-              <a:ext uri="{28A0092B-C50C-407E-A947-70E740481C1C}">
-                <a14:useLocalDpi xmlns:a14="http://schemas.microsoft.com/office/drawing/2010/main" val="0"/>
-              </a:ext>
-            </a:extLst>
-          </a:blip>
-          <a:srcRect/>
-          <a:stretch>
-            <a:fillRect/>
-          </a:stretch>
-        </p:blipFill>
-        <p:spPr bwMode="auto">
-          <a:xfrm>
-            <a:off x="-80796" y="3086100"/>
-            <a:ext cx="12308438" cy="3097643"/>
-          </a:xfrm>
-          <a:prstGeom prst="rect">
-            <a:avLst/>
-          </a:prstGeom>
-          <a:noFill/>
-          <a:extLst>
-            <a:ext uri="{909E8E84-426E-40DD-AFC4-6F175D3DCCD1}">
-              <a14:hiddenFill xmlns:a14="http://schemas.microsoft.com/office/drawing/2010/main">
-                <a:solidFill>
-                  <a:srgbClr val="FFFFFF"/>
-                </a:solidFill>
-              </a14:hiddenFill>
-            </a:ext>
-          </a:extLst>
-        </p:spPr>
-      </p:pic>
       <p:sp>
         <p:nvSpPr>
           <p:cNvPr id="5" name="Rectangle 4">
@@ -40377,6 +40344,53 @@
           </a:p>
         </p:txBody>
       </p:sp>
+      <p:pic>
+        <p:nvPicPr>
+          <p:cNvPr id="1026" name="Picture 2" descr="branching diagram">
+            <a:extLst>
+              <a:ext uri="{FF2B5EF4-FFF2-40B4-BE49-F238E27FC236}">
+                <a16:creationId xmlns:a16="http://schemas.microsoft.com/office/drawing/2014/main" id="{95676EDA-7EB0-4D36-A2B9-E58537F79346}"/>
+              </a:ext>
+            </a:extLst>
+          </p:cNvPr>
+          <p:cNvPicPr>
+            <a:picLocks noChangeAspect="1" noChangeArrowheads="1"/>
+          </p:cNvPicPr>
+          <p:nvPr/>
+        </p:nvPicPr>
+        <p:blipFill>
+          <a:blip r:embed="rId3">
+            <a:extLst>
+              <a:ext uri="{28A0092B-C50C-407E-A947-70E740481C1C}">
+                <a14:useLocalDpi xmlns:a14="http://schemas.microsoft.com/office/drawing/2010/main" val="0"/>
+              </a:ext>
+            </a:extLst>
+          </a:blip>
+          <a:srcRect/>
+          <a:stretch>
+            <a:fillRect/>
+          </a:stretch>
+        </p:blipFill>
+        <p:spPr bwMode="auto">
+          <a:xfrm>
+            <a:off x="0" y="3013635"/>
+            <a:ext cx="12192000" cy="3068637"/>
+          </a:xfrm>
+          <a:prstGeom prst="rect">
+            <a:avLst/>
+          </a:prstGeom>
+          <a:noFill/>
+          <a:extLst>
+            <a:ext uri="{909E8E84-426E-40DD-AFC4-6F175D3DCCD1}">
+              <a14:hiddenFill xmlns:a14="http://schemas.microsoft.com/office/drawing/2010/main">
+                <a:solidFill>
+                  <a:srgbClr val="FFFFFF"/>
+                </a:solidFill>
+              </a14:hiddenFill>
+            </a:ext>
+          </a:extLst>
+        </p:spPr>
+      </p:pic>
     </p:spTree>
     <p:extLst>
       <p:ext uri="{BB962C8B-B14F-4D97-AF65-F5344CB8AC3E}">
@@ -40581,59 +40595,6 @@
                       </p:childTnLst>
                     </p:cTn>
                   </p:par>
-                  <p:par>
-                    <p:cTn id="18" fill="hold">
-                      <p:stCondLst>
-                        <p:cond delay="indefinite"/>
-                      </p:stCondLst>
-                      <p:childTnLst>
-                        <p:par>
-                          <p:cTn id="19" fill="hold">
-                            <p:stCondLst>
-                              <p:cond delay="0"/>
-                            </p:stCondLst>
-                            <p:childTnLst>
-                              <p:par>
-                                <p:cTn id="20" presetID="10" presetClass="entr" presetSubtype="0" fill="hold" nodeType="clickEffect">
-                                  <p:stCondLst>
-                                    <p:cond delay="0"/>
-                                  </p:stCondLst>
-                                  <p:childTnLst>
-                                    <p:set>
-                                      <p:cBhvr>
-                                        <p:cTn id="21" dur="1" fill="hold">
-                                          <p:stCondLst>
-                                            <p:cond delay="0"/>
-                                          </p:stCondLst>
-                                        </p:cTn>
-                                        <p:tgtEl>
-                                          <p:spTgt spid="4"/>
-                                        </p:tgtEl>
-                                        <p:attrNameLst>
-                                          <p:attrName>style.visibility</p:attrName>
-                                        </p:attrNameLst>
-                                      </p:cBhvr>
-                                      <p:to>
-                                        <p:strVal val="visible"/>
-                                      </p:to>
-                                    </p:set>
-                                    <p:animEffect transition="in" filter="fade">
-                                      <p:cBhvr>
-                                        <p:cTn id="22" dur="500"/>
-                                        <p:tgtEl>
-                                          <p:spTgt spid="4"/>
-                                        </p:tgtEl>
-                                      </p:cBhvr>
-                                    </p:animEffect>
-                                  </p:childTnLst>
-                                </p:cTn>
-                              </p:par>
-                            </p:childTnLst>
-                          </p:cTn>
-                        </p:par>
-                      </p:childTnLst>
-                    </p:cTn>
-                  </p:par>
                 </p:childTnLst>
               </p:cTn>
               <p:prevCondLst>
@@ -40857,7 +40818,7 @@
             </a:r>
             <a:r>
               <a:rPr lang="en-US" sz="2400" b="1" dirty="0"/>
-              <a:t>master</a:t>
+              <a:t>main</a:t>
             </a:r>
             <a:r>
               <a:rPr lang="en-US" sz="2400" dirty="0"/>
@@ -41312,7 +41273,7 @@
                   </a:schemeClr>
                 </a:solidFill>
               </a:rPr>
-              <a:t>master</a:t>
+              <a:t>main</a:t>
             </a:r>
             <a:r>
               <a:rPr lang="en-US" sz="3200" dirty="0">
@@ -41359,7 +41320,7 @@
                   </a:schemeClr>
                 </a:solidFill>
               </a:rPr>
-              <a:t> the master branch into the feature branch</a:t>
+              <a:t> the main branch into the feature branch</a:t>
             </a:r>
           </a:p>
           <a:p>
@@ -41386,7 +41347,7 @@
                   <a:schemeClr val="accent6"/>
                 </a:solidFill>
               </a:rPr>
-              <a:t> to the master branch</a:t>
+              <a:t> to the main branch</a:t>
             </a:r>
           </a:p>
           <a:p>
@@ -41397,7 +41358,7 @@
                   <a:schemeClr val="accent6"/>
                 </a:solidFill>
               </a:rPr>
-              <a:t>Team merges the feature branch into the master branch</a:t>
+              <a:t>Team merges the feature branch into the main branch</a:t>
             </a:r>
           </a:p>
         </p:txBody>
@@ -41927,7 +41888,13 @@
       </p:sp>
       <p:pic>
         <p:nvPicPr>
-          <p:cNvPr id="5" name="Picture 2" descr="https://guides.github.com/activities/hello-world/branching.png"/>
+          <p:cNvPr id="2050" name="Picture 2" descr="branching diagram">
+            <a:extLst>
+              <a:ext uri="{FF2B5EF4-FFF2-40B4-BE49-F238E27FC236}">
+                <a16:creationId xmlns:a16="http://schemas.microsoft.com/office/drawing/2014/main" id="{2BB6A91D-0E45-4E0F-8E06-33811A405147}"/>
+              </a:ext>
+            </a:extLst>
+          </p:cNvPr>
           <p:cNvPicPr>
             <a:picLocks noChangeAspect="1" noChangeArrowheads="1"/>
           </p:cNvPicPr>
@@ -41948,8 +41915,8 @@
         </p:blipFill>
         <p:spPr bwMode="auto">
           <a:xfrm>
-            <a:off x="-58219" y="2041516"/>
-            <a:ext cx="12308438" cy="3097643"/>
+            <a:off x="0" y="1893888"/>
+            <a:ext cx="12192000" cy="3068637"/>
           </a:xfrm>
           <a:prstGeom prst="rect">
             <a:avLst/>

</xml_diff>

<commit_message>
Update gitbook 2022-02-07 20:42:12
</commit_message>
<xml_diff>
--- a/IntroToGit/Presentation.pptx
+++ b/IntroToGit/Presentation.pptx
@@ -227,7 +227,7 @@
           <a:p>
             <a:fld id="{19104133-B5B0-4351-8158-4F0E5EB1E2BF}" type="datetimeFigureOut">
               <a:rPr lang="en-US" smtClean="0"/>
-              <a:t>2/22/2021</a:t>
+              <a:t>2/7/2022</a:t>
             </a:fld>
             <a:endParaRPr lang="en-US"/>
           </a:p>
@@ -856,7 +856,7 @@
             </a:r>
             <a:r>
               <a:rPr lang="en-US" b="1" baseline="0" dirty="0"/>
-              <a:t>master</a:t>
+              <a:t>main</a:t>
             </a:r>
             <a:r>
               <a:rPr lang="en-US" b="0" baseline="0" dirty="0"/>
@@ -894,7 +894,7 @@
             </a:r>
             <a:r>
               <a:rPr lang="en-US" b="1" baseline="0" dirty="0"/>
-              <a:t>master</a:t>
+              <a:t>main</a:t>
             </a:r>
             <a:r>
               <a:rPr lang="en-US" b="0" baseline="0" dirty="0"/>
@@ -1024,7 +1024,7 @@
             </a:r>
             <a:r>
               <a:rPr lang="en-US" b="1" baseline="0" dirty="0"/>
-              <a:t>master</a:t>
+              <a:t>main</a:t>
             </a:r>
             <a:r>
               <a:rPr lang="en-US" b="0" baseline="0" dirty="0"/>
@@ -1032,7 +1032,7 @@
             </a:r>
             <a:r>
               <a:rPr lang="en-US" b="1" baseline="0" dirty="0"/>
-              <a:t>master</a:t>
+              <a:t>main</a:t>
             </a:r>
             <a:r>
               <a:rPr lang="en-US" b="0" baseline="0" dirty="0"/>
@@ -1266,7 +1266,7 @@
             </a:r>
             <a:r>
               <a:rPr lang="en-US" b="1" baseline="0" dirty="0"/>
-              <a:t>Note that this does not affect the master branch.</a:t>
+              <a:t>Note that this does not affect the main branch.</a:t>
             </a:r>
           </a:p>
           <a:p>
@@ -1449,7 +1449,15 @@
             </a:r>
             <a:r>
               <a:rPr lang="en-US" i="1" baseline="0" dirty="0"/>
-              <a:t> depiction of changes from master merging into the feature branch, but that is also important.</a:t>
+              <a:t> depiction of changes </a:t>
+            </a:r>
+            <a:r>
+              <a:rPr lang="en-US" i="1" baseline="0"/>
+              <a:t>from main </a:t>
+            </a:r>
+            <a:r>
+              <a:rPr lang="en-US" i="1" baseline="0" dirty="0"/>
+              <a:t>merging into the feature branch, but that is also important.</a:t>
             </a:r>
             <a:r>
               <a:rPr lang="en-US" i="1" dirty="0"/>
@@ -2776,7 +2784,7 @@
             <a:fld id="{1C2D31DE-C454-491C-B5C3-F097855E3DF7}" type="datetime4">
               <a:rPr lang="en-US" smtClean="0"/>
               <a:pPr/>
-              <a:t>February 22, 2021</a:t>
+              <a:t>February 7, 2022</a:t>
             </a:fld>
             <a:endParaRPr lang="en-US" dirty="0"/>
           </a:p>
@@ -6168,7 +6176,7 @@
           <a:p>
             <a:fld id="{5958763E-B898-436D-883D-03711491D54A}" type="datetimeFigureOut">
               <a:rPr lang="en-US" smtClean="0"/>
-              <a:t>2/22/2021</a:t>
+              <a:t>2/7/2022</a:t>
             </a:fld>
             <a:endParaRPr lang="en-US"/>
           </a:p>
@@ -6361,7 +6369,7 @@
           <a:p>
             <a:fld id="{5958763E-B898-436D-883D-03711491D54A}" type="datetimeFigureOut">
               <a:rPr lang="en-US" smtClean="0"/>
-              <a:t>2/22/2021</a:t>
+              <a:t>2/7/2022</a:t>
             </a:fld>
             <a:endParaRPr lang="en-US"/>
           </a:p>
@@ -6611,7 +6619,7 @@
           <a:p>
             <a:fld id="{5958763E-B898-436D-883D-03711491D54A}" type="datetimeFigureOut">
               <a:rPr lang="en-US" smtClean="0"/>
-              <a:t>2/22/2021</a:t>
+              <a:t>2/7/2022</a:t>
             </a:fld>
             <a:endParaRPr lang="en-US"/>
           </a:p>
@@ -6959,7 +6967,7 @@
           <a:p>
             <a:fld id="{5958763E-B898-436D-883D-03711491D54A}" type="datetimeFigureOut">
               <a:rPr lang="en-US" smtClean="0"/>
-              <a:t>2/22/2021</a:t>
+              <a:t>2/7/2022</a:t>
             </a:fld>
             <a:endParaRPr lang="en-US"/>
           </a:p>
@@ -7375,7 +7383,7 @@
           <a:p>
             <a:fld id="{5958763E-B898-436D-883D-03711491D54A}" type="datetimeFigureOut">
               <a:rPr lang="en-US" smtClean="0"/>
-              <a:t>2/22/2021</a:t>
+              <a:t>2/7/2022</a:t>
             </a:fld>
             <a:endParaRPr lang="en-US"/>
           </a:p>
@@ -7876,7 +7884,7 @@
           <a:p>
             <a:fld id="{5958763E-B898-436D-883D-03711491D54A}" type="datetimeFigureOut">
               <a:rPr lang="en-US" smtClean="0"/>
-              <a:t>2/22/2021</a:t>
+              <a:t>2/7/2022</a:t>
             </a:fld>
             <a:endParaRPr lang="en-US"/>
           </a:p>
@@ -8327,7 +8335,7 @@
           <a:p>
             <a:fld id="{5958763E-B898-436D-883D-03711491D54A}" type="datetimeFigureOut">
               <a:rPr lang="en-US" smtClean="0"/>
-              <a:t>2/22/2021</a:t>
+              <a:t>2/7/2022</a:t>
             </a:fld>
             <a:endParaRPr lang="en-US"/>
           </a:p>
@@ -8938,7 +8946,7 @@
           <a:p>
             <a:fld id="{5958763E-B898-436D-883D-03711491D54A}" type="datetimeFigureOut">
               <a:rPr lang="en-US" smtClean="0"/>
-              <a:t>2/22/2021</a:t>
+              <a:t>2/7/2022</a:t>
             </a:fld>
             <a:endParaRPr lang="en-US"/>
           </a:p>
@@ -9709,7 +9717,7 @@
           <a:p>
             <a:fld id="{5958763E-B898-436D-883D-03711491D54A}" type="datetimeFigureOut">
               <a:rPr lang="en-US" smtClean="0"/>
-              <a:t>2/22/2021</a:t>
+              <a:t>2/7/2022</a:t>
             </a:fld>
             <a:endParaRPr lang="en-US"/>
           </a:p>
@@ -9813,7 +9821,7 @@
           <a:p>
             <a:fld id="{5958763E-B898-436D-883D-03711491D54A}" type="datetimeFigureOut">
               <a:rPr lang="en-US" smtClean="0"/>
-              <a:t>2/22/2021</a:t>
+              <a:t>2/7/2022</a:t>
             </a:fld>
             <a:endParaRPr lang="en-US"/>
           </a:p>
@@ -10140,7 +10148,7 @@
             <a:fld id="{1C2D31DE-C454-491C-B5C3-F097855E3DF7}" type="datetime4">
               <a:rPr lang="en-US" smtClean="0"/>
               <a:pPr/>
-              <a:t>February 22, 2021</a:t>
+              <a:t>February 7, 2022</a:t>
             </a:fld>
             <a:endParaRPr lang="en-US" dirty="0"/>
           </a:p>
@@ -13292,7 +13300,7 @@
           <a:p>
             <a:fld id="{5958763E-B898-436D-883D-03711491D54A}" type="datetimeFigureOut">
               <a:rPr lang="en-US" smtClean="0"/>
-              <a:t>2/22/2021</a:t>
+              <a:t>2/7/2022</a:t>
             </a:fld>
             <a:endParaRPr lang="en-US"/>
           </a:p>
@@ -13416,7 +13424,7 @@
           <a:p>
             <a:fld id="{5958763E-B898-436D-883D-03711491D54A}" type="datetimeFigureOut">
               <a:rPr lang="en-US" smtClean="0"/>
-              <a:t>2/22/2021</a:t>
+              <a:t>2/7/2022</a:t>
             </a:fld>
             <a:endParaRPr lang="en-US"/>
           </a:p>
@@ -13540,7 +13548,7 @@
           <a:p>
             <a:fld id="{5958763E-B898-436D-883D-03711491D54A}" type="datetimeFigureOut">
               <a:rPr lang="en-US" smtClean="0"/>
-              <a:t>2/22/2021</a:t>
+              <a:t>2/7/2022</a:t>
             </a:fld>
             <a:endParaRPr lang="en-US"/>
           </a:p>
@@ -13664,7 +13672,7 @@
           <a:p>
             <a:fld id="{5958763E-B898-436D-883D-03711491D54A}" type="datetimeFigureOut">
               <a:rPr lang="en-US" smtClean="0"/>
-              <a:t>2/22/2021</a:t>
+              <a:t>2/7/2022</a:t>
             </a:fld>
             <a:endParaRPr lang="en-US"/>
           </a:p>
@@ -13788,7 +13796,7 @@
           <a:p>
             <a:fld id="{5958763E-B898-436D-883D-03711491D54A}" type="datetimeFigureOut">
               <a:rPr lang="en-US" smtClean="0"/>
-              <a:t>2/22/2021</a:t>
+              <a:t>2/7/2022</a:t>
             </a:fld>
             <a:endParaRPr lang="en-US"/>
           </a:p>
@@ -13912,7 +13920,7 @@
           <a:p>
             <a:fld id="{5958763E-B898-436D-883D-03711491D54A}" type="datetimeFigureOut">
               <a:rPr lang="en-US" smtClean="0"/>
-              <a:t>2/22/2021</a:t>
+              <a:t>2/7/2022</a:t>
             </a:fld>
             <a:endParaRPr lang="en-US"/>
           </a:p>
@@ -14036,7 +14044,7 @@
           <a:p>
             <a:fld id="{5958763E-B898-436D-883D-03711491D54A}" type="datetimeFigureOut">
               <a:rPr lang="en-US" smtClean="0"/>
-              <a:t>2/22/2021</a:t>
+              <a:t>2/7/2022</a:t>
             </a:fld>
             <a:endParaRPr lang="en-US"/>
           </a:p>
@@ -14160,7 +14168,7 @@
           <a:p>
             <a:fld id="{5958763E-B898-436D-883D-03711491D54A}" type="datetimeFigureOut">
               <a:rPr lang="en-US" smtClean="0"/>
-              <a:t>2/22/2021</a:t>
+              <a:t>2/7/2022</a:t>
             </a:fld>
             <a:endParaRPr lang="en-US"/>
           </a:p>
@@ -14293,7 +14301,7 @@
           <a:p>
             <a:fld id="{5958763E-B898-436D-883D-03711491D54A}" type="datetimeFigureOut">
               <a:rPr lang="en-US" smtClean="0"/>
-              <a:t>2/22/2021</a:t>
+              <a:t>2/7/2022</a:t>
             </a:fld>
             <a:endParaRPr lang="en-US"/>
           </a:p>
@@ -17632,7 +17640,7 @@
             <a:fld id="{1C2D31DE-C454-491C-B5C3-F097855E3DF7}" type="datetime4">
               <a:rPr lang="en-US" smtClean="0"/>
               <a:pPr/>
-              <a:t>February 22, 2021</a:t>
+              <a:t>February 7, 2022</a:t>
             </a:fld>
             <a:endParaRPr lang="en-US" dirty="0"/>
           </a:p>
@@ -29868,7 +29876,7 @@
           <a:p>
             <a:fld id="{5958763E-B898-436D-883D-03711491D54A}" type="datetimeFigureOut">
               <a:rPr lang="en-US" smtClean="0"/>
-              <a:t>2/22/2021</a:t>
+              <a:t>2/7/2022</a:t>
             </a:fld>
             <a:endParaRPr lang="en-US"/>
           </a:p>
@@ -30270,7 +30278,7 @@
           <a:p>
             <a:fld id="{5958763E-B898-436D-883D-03711491D54A}" type="datetimeFigureOut">
               <a:rPr lang="en-US" smtClean="0"/>
-              <a:t>2/22/2021</a:t>
+              <a:t>2/7/2022</a:t>
             </a:fld>
             <a:endParaRPr lang="en-US"/>
           </a:p>
@@ -30564,7 +30572,7 @@
           <a:p>
             <a:fld id="{5958763E-B898-436D-883D-03711491D54A}" type="datetimeFigureOut">
               <a:rPr lang="en-US" smtClean="0"/>
-              <a:t>2/22/2021</a:t>
+              <a:t>2/7/2022</a:t>
             </a:fld>
             <a:endParaRPr lang="en-US"/>
           </a:p>
@@ -30765,7 +30773,7 @@
           <a:p>
             <a:fld id="{5958763E-B898-436D-883D-03711491D54A}" type="datetimeFigureOut">
               <a:rPr lang="en-US" smtClean="0"/>
-              <a:t>2/22/2021</a:t>
+              <a:t>2/7/2022</a:t>
             </a:fld>
             <a:endParaRPr lang="en-US"/>
           </a:p>
@@ -31026,7 +31034,7 @@
           <a:p>
             <a:fld id="{5958763E-B898-436D-883D-03711491D54A}" type="datetimeFigureOut">
               <a:rPr lang="en-US" smtClean="0"/>
-              <a:t>2/22/2021</a:t>
+              <a:t>2/7/2022</a:t>
             </a:fld>
             <a:endParaRPr lang="en-US"/>
           </a:p>
@@ -31534,7 +31542,7 @@
           <a:p>
             <a:fld id="{5958763E-B898-436D-883D-03711491D54A}" type="datetimeFigureOut">
               <a:rPr lang="en-US" smtClean="0"/>
-              <a:t>2/22/2021</a:t>
+              <a:t>2/7/2022</a:t>
             </a:fld>
             <a:endParaRPr lang="en-US"/>
           </a:p>
@@ -32013,7 +32021,7 @@
           <a:p>
             <a:fld id="{5958763E-B898-436D-883D-03711491D54A}" type="datetimeFigureOut">
               <a:rPr lang="en-US" smtClean="0"/>
-              <a:t>2/22/2021</a:t>
+              <a:t>2/7/2022</a:t>
             </a:fld>
             <a:endParaRPr lang="en-US"/>
           </a:p>
@@ -32832,7 +32840,7 @@
           <a:p>
             <a:fld id="{5958763E-B898-436D-883D-03711491D54A}" type="datetimeFigureOut">
               <a:rPr lang="en-US" smtClean="0"/>
-              <a:t>2/22/2021</a:t>
+              <a:t>2/7/2022</a:t>
             </a:fld>
             <a:endParaRPr lang="en-US"/>
           </a:p>
@@ -33033,7 +33041,7 @@
           <a:p>
             <a:fld id="{5958763E-B898-436D-883D-03711491D54A}" type="datetimeFigureOut">
               <a:rPr lang="en-US" smtClean="0"/>
-              <a:t>2/22/2021</a:t>
+              <a:t>2/7/2022</a:t>
             </a:fld>
             <a:endParaRPr lang="en-US"/>
           </a:p>
@@ -33368,7 +33376,7 @@
           <a:p>
             <a:fld id="{5958763E-B898-436D-883D-03711491D54A}" type="datetimeFigureOut">
               <a:rPr lang="en-US" smtClean="0"/>
-              <a:t>2/22/2021</a:t>
+              <a:t>2/7/2022</a:t>
             </a:fld>
             <a:endParaRPr lang="en-US"/>
           </a:p>
@@ -33598,7 +33606,7 @@
           <a:p>
             <a:fld id="{5958763E-B898-436D-883D-03711491D54A}" type="datetimeFigureOut">
               <a:rPr lang="en-US" smtClean="0"/>
-              <a:t>2/22/2021</a:t>
+              <a:t>2/7/2022</a:t>
             </a:fld>
             <a:endParaRPr lang="en-US"/>
           </a:p>
@@ -33842,7 +33850,7 @@
           <a:p>
             <a:fld id="{5958763E-B898-436D-883D-03711491D54A}" type="datetimeFigureOut">
               <a:rPr lang="en-US" smtClean="0"/>
-              <a:t>2/22/2021</a:t>
+              <a:t>2/7/2022</a:t>
             </a:fld>
             <a:endParaRPr lang="en-US"/>
           </a:p>
@@ -39824,7 +39832,7 @@
             </a:r>
             <a:r>
               <a:rPr lang="en-US" sz="2400" b="1" dirty="0"/>
-              <a:t>master</a:t>
+              <a:t>main</a:t>
             </a:r>
             <a:r>
               <a:rPr lang="en-US" sz="2400" dirty="0"/>
@@ -39838,47 +39846,6 @@
           </a:p>
         </p:txBody>
       </p:sp>
-      <p:pic>
-        <p:nvPicPr>
-          <p:cNvPr id="4" name="Picture 2" descr="https://guides.github.com/activities/hello-world/branching.png"/>
-          <p:cNvPicPr>
-            <a:picLocks noChangeAspect="1" noChangeArrowheads="1"/>
-          </p:cNvPicPr>
-          <p:nvPr/>
-        </p:nvPicPr>
-        <p:blipFill>
-          <a:blip r:embed="rId3">
-            <a:extLst>
-              <a:ext uri="{28A0092B-C50C-407E-A947-70E740481C1C}">
-                <a14:useLocalDpi xmlns:a14="http://schemas.microsoft.com/office/drawing/2010/main" val="0"/>
-              </a:ext>
-            </a:extLst>
-          </a:blip>
-          <a:srcRect/>
-          <a:stretch>
-            <a:fillRect/>
-          </a:stretch>
-        </p:blipFill>
-        <p:spPr bwMode="auto">
-          <a:xfrm>
-            <a:off x="-80796" y="3086100"/>
-            <a:ext cx="12308438" cy="3097643"/>
-          </a:xfrm>
-          <a:prstGeom prst="rect">
-            <a:avLst/>
-          </a:prstGeom>
-          <a:noFill/>
-          <a:extLst>
-            <a:ext uri="{909E8E84-426E-40DD-AFC4-6F175D3DCCD1}">
-              <a14:hiddenFill xmlns:a14="http://schemas.microsoft.com/office/drawing/2010/main">
-                <a:solidFill>
-                  <a:srgbClr val="FFFFFF"/>
-                </a:solidFill>
-              </a14:hiddenFill>
-            </a:ext>
-          </a:extLst>
-        </p:spPr>
-      </p:pic>
       <p:sp>
         <p:nvSpPr>
           <p:cNvPr id="5" name="Rectangle 4">
@@ -40377,6 +40344,53 @@
           </a:p>
         </p:txBody>
       </p:sp>
+      <p:pic>
+        <p:nvPicPr>
+          <p:cNvPr id="1026" name="Picture 2" descr="branching diagram">
+            <a:extLst>
+              <a:ext uri="{FF2B5EF4-FFF2-40B4-BE49-F238E27FC236}">
+                <a16:creationId xmlns:a16="http://schemas.microsoft.com/office/drawing/2014/main" id="{95676EDA-7EB0-4D36-A2B9-E58537F79346}"/>
+              </a:ext>
+            </a:extLst>
+          </p:cNvPr>
+          <p:cNvPicPr>
+            <a:picLocks noChangeAspect="1" noChangeArrowheads="1"/>
+          </p:cNvPicPr>
+          <p:nvPr/>
+        </p:nvPicPr>
+        <p:blipFill>
+          <a:blip r:embed="rId3">
+            <a:extLst>
+              <a:ext uri="{28A0092B-C50C-407E-A947-70E740481C1C}">
+                <a14:useLocalDpi xmlns:a14="http://schemas.microsoft.com/office/drawing/2010/main" val="0"/>
+              </a:ext>
+            </a:extLst>
+          </a:blip>
+          <a:srcRect/>
+          <a:stretch>
+            <a:fillRect/>
+          </a:stretch>
+        </p:blipFill>
+        <p:spPr bwMode="auto">
+          <a:xfrm>
+            <a:off x="0" y="3013635"/>
+            <a:ext cx="12192000" cy="3068637"/>
+          </a:xfrm>
+          <a:prstGeom prst="rect">
+            <a:avLst/>
+          </a:prstGeom>
+          <a:noFill/>
+          <a:extLst>
+            <a:ext uri="{909E8E84-426E-40DD-AFC4-6F175D3DCCD1}">
+              <a14:hiddenFill xmlns:a14="http://schemas.microsoft.com/office/drawing/2010/main">
+                <a:solidFill>
+                  <a:srgbClr val="FFFFFF"/>
+                </a:solidFill>
+              </a14:hiddenFill>
+            </a:ext>
+          </a:extLst>
+        </p:spPr>
+      </p:pic>
     </p:spTree>
     <p:extLst>
       <p:ext uri="{BB962C8B-B14F-4D97-AF65-F5344CB8AC3E}">
@@ -40581,59 +40595,6 @@
                       </p:childTnLst>
                     </p:cTn>
                   </p:par>
-                  <p:par>
-                    <p:cTn id="18" fill="hold">
-                      <p:stCondLst>
-                        <p:cond delay="indefinite"/>
-                      </p:stCondLst>
-                      <p:childTnLst>
-                        <p:par>
-                          <p:cTn id="19" fill="hold">
-                            <p:stCondLst>
-                              <p:cond delay="0"/>
-                            </p:stCondLst>
-                            <p:childTnLst>
-                              <p:par>
-                                <p:cTn id="20" presetID="10" presetClass="entr" presetSubtype="0" fill="hold" nodeType="clickEffect">
-                                  <p:stCondLst>
-                                    <p:cond delay="0"/>
-                                  </p:stCondLst>
-                                  <p:childTnLst>
-                                    <p:set>
-                                      <p:cBhvr>
-                                        <p:cTn id="21" dur="1" fill="hold">
-                                          <p:stCondLst>
-                                            <p:cond delay="0"/>
-                                          </p:stCondLst>
-                                        </p:cTn>
-                                        <p:tgtEl>
-                                          <p:spTgt spid="4"/>
-                                        </p:tgtEl>
-                                        <p:attrNameLst>
-                                          <p:attrName>style.visibility</p:attrName>
-                                        </p:attrNameLst>
-                                      </p:cBhvr>
-                                      <p:to>
-                                        <p:strVal val="visible"/>
-                                      </p:to>
-                                    </p:set>
-                                    <p:animEffect transition="in" filter="fade">
-                                      <p:cBhvr>
-                                        <p:cTn id="22" dur="500"/>
-                                        <p:tgtEl>
-                                          <p:spTgt spid="4"/>
-                                        </p:tgtEl>
-                                      </p:cBhvr>
-                                    </p:animEffect>
-                                  </p:childTnLst>
-                                </p:cTn>
-                              </p:par>
-                            </p:childTnLst>
-                          </p:cTn>
-                        </p:par>
-                      </p:childTnLst>
-                    </p:cTn>
-                  </p:par>
                 </p:childTnLst>
               </p:cTn>
               <p:prevCondLst>
@@ -40857,7 +40818,7 @@
             </a:r>
             <a:r>
               <a:rPr lang="en-US" sz="2400" b="1" dirty="0"/>
-              <a:t>master</a:t>
+              <a:t>main</a:t>
             </a:r>
             <a:r>
               <a:rPr lang="en-US" sz="2400" dirty="0"/>
@@ -41312,7 +41273,7 @@
                   </a:schemeClr>
                 </a:solidFill>
               </a:rPr>
-              <a:t>master</a:t>
+              <a:t>main</a:t>
             </a:r>
             <a:r>
               <a:rPr lang="en-US" sz="3200" dirty="0">
@@ -41359,7 +41320,7 @@
                   </a:schemeClr>
                 </a:solidFill>
               </a:rPr>
-              <a:t> the master branch into the feature branch</a:t>
+              <a:t> the main branch into the feature branch</a:t>
             </a:r>
           </a:p>
           <a:p>
@@ -41386,7 +41347,7 @@
                   <a:schemeClr val="accent6"/>
                 </a:solidFill>
               </a:rPr>
-              <a:t> to the master branch</a:t>
+              <a:t> to the main branch</a:t>
             </a:r>
           </a:p>
           <a:p>
@@ -41397,7 +41358,7 @@
                   <a:schemeClr val="accent6"/>
                 </a:solidFill>
               </a:rPr>
-              <a:t>Team merges the feature branch into the master branch</a:t>
+              <a:t>Team merges the feature branch into the main branch</a:t>
             </a:r>
           </a:p>
         </p:txBody>
@@ -41927,7 +41888,13 @@
       </p:sp>
       <p:pic>
         <p:nvPicPr>
-          <p:cNvPr id="5" name="Picture 2" descr="https://guides.github.com/activities/hello-world/branching.png"/>
+          <p:cNvPr id="2050" name="Picture 2" descr="branching diagram">
+            <a:extLst>
+              <a:ext uri="{FF2B5EF4-FFF2-40B4-BE49-F238E27FC236}">
+                <a16:creationId xmlns:a16="http://schemas.microsoft.com/office/drawing/2014/main" id="{2BB6A91D-0E45-4E0F-8E06-33811A405147}"/>
+              </a:ext>
+            </a:extLst>
+          </p:cNvPr>
           <p:cNvPicPr>
             <a:picLocks noChangeAspect="1" noChangeArrowheads="1"/>
           </p:cNvPicPr>
@@ -41948,8 +41915,8 @@
         </p:blipFill>
         <p:spPr bwMode="auto">
           <a:xfrm>
-            <a:off x="-58219" y="2041516"/>
-            <a:ext cx="12308438" cy="3097643"/>
+            <a:off x="0" y="1893888"/>
+            <a:ext cx="12192000" cy="3068637"/>
           </a:xfrm>
           <a:prstGeom prst="rect">
             <a:avLst/>

</xml_diff>

<commit_message>
Update gitbook 2022-03-29 20:12:37
</commit_message>
<xml_diff>
--- a/IntroToGit/Presentation.pptx
+++ b/IntroToGit/Presentation.pptx
@@ -227,7 +227,7 @@
           <a:p>
             <a:fld id="{19104133-B5B0-4351-8158-4F0E5EB1E2BF}" type="datetimeFigureOut">
               <a:rPr lang="en-US" smtClean="0"/>
-              <a:t>2/7/2022</a:t>
+              <a:t>3/29/2022</a:t>
             </a:fld>
             <a:endParaRPr lang="en-US"/>
           </a:p>
@@ -2784,7 +2784,7 @@
             <a:fld id="{1C2D31DE-C454-491C-B5C3-F097855E3DF7}" type="datetime4">
               <a:rPr lang="en-US" smtClean="0"/>
               <a:pPr/>
-              <a:t>February 7, 2022</a:t>
+              <a:t>March 29, 2022</a:t>
             </a:fld>
             <a:endParaRPr lang="en-US" dirty="0"/>
           </a:p>
@@ -6176,7 +6176,7 @@
           <a:p>
             <a:fld id="{5958763E-B898-436D-883D-03711491D54A}" type="datetimeFigureOut">
               <a:rPr lang="en-US" smtClean="0"/>
-              <a:t>2/7/2022</a:t>
+              <a:t>3/29/2022</a:t>
             </a:fld>
             <a:endParaRPr lang="en-US"/>
           </a:p>
@@ -6369,7 +6369,7 @@
           <a:p>
             <a:fld id="{5958763E-B898-436D-883D-03711491D54A}" type="datetimeFigureOut">
               <a:rPr lang="en-US" smtClean="0"/>
-              <a:t>2/7/2022</a:t>
+              <a:t>3/29/2022</a:t>
             </a:fld>
             <a:endParaRPr lang="en-US"/>
           </a:p>
@@ -6619,7 +6619,7 @@
           <a:p>
             <a:fld id="{5958763E-B898-436D-883D-03711491D54A}" type="datetimeFigureOut">
               <a:rPr lang="en-US" smtClean="0"/>
-              <a:t>2/7/2022</a:t>
+              <a:t>3/29/2022</a:t>
             </a:fld>
             <a:endParaRPr lang="en-US"/>
           </a:p>
@@ -6967,7 +6967,7 @@
           <a:p>
             <a:fld id="{5958763E-B898-436D-883D-03711491D54A}" type="datetimeFigureOut">
               <a:rPr lang="en-US" smtClean="0"/>
-              <a:t>2/7/2022</a:t>
+              <a:t>3/29/2022</a:t>
             </a:fld>
             <a:endParaRPr lang="en-US"/>
           </a:p>
@@ -7383,7 +7383,7 @@
           <a:p>
             <a:fld id="{5958763E-B898-436D-883D-03711491D54A}" type="datetimeFigureOut">
               <a:rPr lang="en-US" smtClean="0"/>
-              <a:t>2/7/2022</a:t>
+              <a:t>3/29/2022</a:t>
             </a:fld>
             <a:endParaRPr lang="en-US"/>
           </a:p>
@@ -7884,7 +7884,7 @@
           <a:p>
             <a:fld id="{5958763E-B898-436D-883D-03711491D54A}" type="datetimeFigureOut">
               <a:rPr lang="en-US" smtClean="0"/>
-              <a:t>2/7/2022</a:t>
+              <a:t>3/29/2022</a:t>
             </a:fld>
             <a:endParaRPr lang="en-US"/>
           </a:p>
@@ -8335,7 +8335,7 @@
           <a:p>
             <a:fld id="{5958763E-B898-436D-883D-03711491D54A}" type="datetimeFigureOut">
               <a:rPr lang="en-US" smtClean="0"/>
-              <a:t>2/7/2022</a:t>
+              <a:t>3/29/2022</a:t>
             </a:fld>
             <a:endParaRPr lang="en-US"/>
           </a:p>
@@ -8946,7 +8946,7 @@
           <a:p>
             <a:fld id="{5958763E-B898-436D-883D-03711491D54A}" type="datetimeFigureOut">
               <a:rPr lang="en-US" smtClean="0"/>
-              <a:t>2/7/2022</a:t>
+              <a:t>3/29/2022</a:t>
             </a:fld>
             <a:endParaRPr lang="en-US"/>
           </a:p>
@@ -9717,7 +9717,7 @@
           <a:p>
             <a:fld id="{5958763E-B898-436D-883D-03711491D54A}" type="datetimeFigureOut">
               <a:rPr lang="en-US" smtClean="0"/>
-              <a:t>2/7/2022</a:t>
+              <a:t>3/29/2022</a:t>
             </a:fld>
             <a:endParaRPr lang="en-US"/>
           </a:p>
@@ -9821,7 +9821,7 @@
           <a:p>
             <a:fld id="{5958763E-B898-436D-883D-03711491D54A}" type="datetimeFigureOut">
               <a:rPr lang="en-US" smtClean="0"/>
-              <a:t>2/7/2022</a:t>
+              <a:t>3/29/2022</a:t>
             </a:fld>
             <a:endParaRPr lang="en-US"/>
           </a:p>
@@ -10148,7 +10148,7 @@
             <a:fld id="{1C2D31DE-C454-491C-B5C3-F097855E3DF7}" type="datetime4">
               <a:rPr lang="en-US" smtClean="0"/>
               <a:pPr/>
-              <a:t>February 7, 2022</a:t>
+              <a:t>March 29, 2022</a:t>
             </a:fld>
             <a:endParaRPr lang="en-US" dirty="0"/>
           </a:p>
@@ -13300,7 +13300,7 @@
           <a:p>
             <a:fld id="{5958763E-B898-436D-883D-03711491D54A}" type="datetimeFigureOut">
               <a:rPr lang="en-US" smtClean="0"/>
-              <a:t>2/7/2022</a:t>
+              <a:t>3/29/2022</a:t>
             </a:fld>
             <a:endParaRPr lang="en-US"/>
           </a:p>
@@ -13424,7 +13424,7 @@
           <a:p>
             <a:fld id="{5958763E-B898-436D-883D-03711491D54A}" type="datetimeFigureOut">
               <a:rPr lang="en-US" smtClean="0"/>
-              <a:t>2/7/2022</a:t>
+              <a:t>3/29/2022</a:t>
             </a:fld>
             <a:endParaRPr lang="en-US"/>
           </a:p>
@@ -13548,7 +13548,7 @@
           <a:p>
             <a:fld id="{5958763E-B898-436D-883D-03711491D54A}" type="datetimeFigureOut">
               <a:rPr lang="en-US" smtClean="0"/>
-              <a:t>2/7/2022</a:t>
+              <a:t>3/29/2022</a:t>
             </a:fld>
             <a:endParaRPr lang="en-US"/>
           </a:p>
@@ -13672,7 +13672,7 @@
           <a:p>
             <a:fld id="{5958763E-B898-436D-883D-03711491D54A}" type="datetimeFigureOut">
               <a:rPr lang="en-US" smtClean="0"/>
-              <a:t>2/7/2022</a:t>
+              <a:t>3/29/2022</a:t>
             </a:fld>
             <a:endParaRPr lang="en-US"/>
           </a:p>
@@ -13796,7 +13796,7 @@
           <a:p>
             <a:fld id="{5958763E-B898-436D-883D-03711491D54A}" type="datetimeFigureOut">
               <a:rPr lang="en-US" smtClean="0"/>
-              <a:t>2/7/2022</a:t>
+              <a:t>3/29/2022</a:t>
             </a:fld>
             <a:endParaRPr lang="en-US"/>
           </a:p>
@@ -13920,7 +13920,7 @@
           <a:p>
             <a:fld id="{5958763E-B898-436D-883D-03711491D54A}" type="datetimeFigureOut">
               <a:rPr lang="en-US" smtClean="0"/>
-              <a:t>2/7/2022</a:t>
+              <a:t>3/29/2022</a:t>
             </a:fld>
             <a:endParaRPr lang="en-US"/>
           </a:p>
@@ -14044,7 +14044,7 @@
           <a:p>
             <a:fld id="{5958763E-B898-436D-883D-03711491D54A}" type="datetimeFigureOut">
               <a:rPr lang="en-US" smtClean="0"/>
-              <a:t>2/7/2022</a:t>
+              <a:t>3/29/2022</a:t>
             </a:fld>
             <a:endParaRPr lang="en-US"/>
           </a:p>
@@ -14168,7 +14168,7 @@
           <a:p>
             <a:fld id="{5958763E-B898-436D-883D-03711491D54A}" type="datetimeFigureOut">
               <a:rPr lang="en-US" smtClean="0"/>
-              <a:t>2/7/2022</a:t>
+              <a:t>3/29/2022</a:t>
             </a:fld>
             <a:endParaRPr lang="en-US"/>
           </a:p>
@@ -14301,7 +14301,7 @@
           <a:p>
             <a:fld id="{5958763E-B898-436D-883D-03711491D54A}" type="datetimeFigureOut">
               <a:rPr lang="en-US" smtClean="0"/>
-              <a:t>2/7/2022</a:t>
+              <a:t>3/29/2022</a:t>
             </a:fld>
             <a:endParaRPr lang="en-US"/>
           </a:p>
@@ -17640,7 +17640,7 @@
             <a:fld id="{1C2D31DE-C454-491C-B5C3-F097855E3DF7}" type="datetime4">
               <a:rPr lang="en-US" smtClean="0"/>
               <a:pPr/>
-              <a:t>February 7, 2022</a:t>
+              <a:t>March 29, 2022</a:t>
             </a:fld>
             <a:endParaRPr lang="en-US" dirty="0"/>
           </a:p>
@@ -29876,7 +29876,7 @@
           <a:p>
             <a:fld id="{5958763E-B898-436D-883D-03711491D54A}" type="datetimeFigureOut">
               <a:rPr lang="en-US" smtClean="0"/>
-              <a:t>2/7/2022</a:t>
+              <a:t>3/29/2022</a:t>
             </a:fld>
             <a:endParaRPr lang="en-US"/>
           </a:p>
@@ -30278,7 +30278,7 @@
           <a:p>
             <a:fld id="{5958763E-B898-436D-883D-03711491D54A}" type="datetimeFigureOut">
               <a:rPr lang="en-US" smtClean="0"/>
-              <a:t>2/7/2022</a:t>
+              <a:t>3/29/2022</a:t>
             </a:fld>
             <a:endParaRPr lang="en-US"/>
           </a:p>
@@ -30572,7 +30572,7 @@
           <a:p>
             <a:fld id="{5958763E-B898-436D-883D-03711491D54A}" type="datetimeFigureOut">
               <a:rPr lang="en-US" smtClean="0"/>
-              <a:t>2/7/2022</a:t>
+              <a:t>3/29/2022</a:t>
             </a:fld>
             <a:endParaRPr lang="en-US"/>
           </a:p>
@@ -30773,7 +30773,7 @@
           <a:p>
             <a:fld id="{5958763E-B898-436D-883D-03711491D54A}" type="datetimeFigureOut">
               <a:rPr lang="en-US" smtClean="0"/>
-              <a:t>2/7/2022</a:t>
+              <a:t>3/29/2022</a:t>
             </a:fld>
             <a:endParaRPr lang="en-US"/>
           </a:p>
@@ -31034,7 +31034,7 @@
           <a:p>
             <a:fld id="{5958763E-B898-436D-883D-03711491D54A}" type="datetimeFigureOut">
               <a:rPr lang="en-US" smtClean="0"/>
-              <a:t>2/7/2022</a:t>
+              <a:t>3/29/2022</a:t>
             </a:fld>
             <a:endParaRPr lang="en-US"/>
           </a:p>
@@ -31542,7 +31542,7 @@
           <a:p>
             <a:fld id="{5958763E-B898-436D-883D-03711491D54A}" type="datetimeFigureOut">
               <a:rPr lang="en-US" smtClean="0"/>
-              <a:t>2/7/2022</a:t>
+              <a:t>3/29/2022</a:t>
             </a:fld>
             <a:endParaRPr lang="en-US"/>
           </a:p>
@@ -32021,7 +32021,7 @@
           <a:p>
             <a:fld id="{5958763E-B898-436D-883D-03711491D54A}" type="datetimeFigureOut">
               <a:rPr lang="en-US" smtClean="0"/>
-              <a:t>2/7/2022</a:t>
+              <a:t>3/29/2022</a:t>
             </a:fld>
             <a:endParaRPr lang="en-US"/>
           </a:p>
@@ -32840,7 +32840,7 @@
           <a:p>
             <a:fld id="{5958763E-B898-436D-883D-03711491D54A}" type="datetimeFigureOut">
               <a:rPr lang="en-US" smtClean="0"/>
-              <a:t>2/7/2022</a:t>
+              <a:t>3/29/2022</a:t>
             </a:fld>
             <a:endParaRPr lang="en-US"/>
           </a:p>
@@ -33041,7 +33041,7 @@
           <a:p>
             <a:fld id="{5958763E-B898-436D-883D-03711491D54A}" type="datetimeFigureOut">
               <a:rPr lang="en-US" smtClean="0"/>
-              <a:t>2/7/2022</a:t>
+              <a:t>3/29/2022</a:t>
             </a:fld>
             <a:endParaRPr lang="en-US"/>
           </a:p>
@@ -33376,7 +33376,7 @@
           <a:p>
             <a:fld id="{5958763E-B898-436D-883D-03711491D54A}" type="datetimeFigureOut">
               <a:rPr lang="en-US" smtClean="0"/>
-              <a:t>2/7/2022</a:t>
+              <a:t>3/29/2022</a:t>
             </a:fld>
             <a:endParaRPr lang="en-US"/>
           </a:p>
@@ -33606,7 +33606,7 @@
           <a:p>
             <a:fld id="{5958763E-B898-436D-883D-03711491D54A}" type="datetimeFigureOut">
               <a:rPr lang="en-US" smtClean="0"/>
-              <a:t>2/7/2022</a:t>
+              <a:t>3/29/2022</a:t>
             </a:fld>
             <a:endParaRPr lang="en-US"/>
           </a:p>
@@ -33850,7 +33850,7 @@
           <a:p>
             <a:fld id="{5958763E-B898-436D-883D-03711491D54A}" type="datetimeFigureOut">
               <a:rPr lang="en-US" smtClean="0"/>
-              <a:t>2/7/2022</a:t>
+              <a:t>3/29/2022</a:t>
             </a:fld>
             <a:endParaRPr lang="en-US"/>
           </a:p>
@@ -38169,7 +38169,15 @@
           <a:p>
             <a:r>
               <a:rPr lang="en-US" dirty="0"/>
-              <a:t>Pull from the remove repository</a:t>
+              <a:t>Pull from </a:t>
+            </a:r>
+            <a:r>
+              <a:rPr lang="en-US"/>
+              <a:t>the remote </a:t>
+            </a:r>
+            <a:r>
+              <a:rPr lang="en-US" dirty="0"/>
+              <a:t>repository</a:t>
             </a:r>
           </a:p>
           <a:p>

</xml_diff>